<commit_message>
Code erklärung und Rekursion bearbeitet
</commit_message>
<xml_diff>
--- a/Präsentation/Quicksort.pptx
+++ b/Präsentation/Quicksort.pptx
@@ -265,7 +265,7 @@
           <a:p>
             <a:fld id="{95096795-3C61-46C8-99AF-115DB53051C4}" type="datetimeFigureOut">
               <a:rPr lang="de-DE" smtClean="0"/>
-              <a:t>24.02.2020</a:t>
+              <a:t>25.02.2020</a:t>
             </a:fld>
             <a:endParaRPr lang="de-DE" dirty="0"/>
           </a:p>
@@ -430,7 +430,7 @@
           <a:p>
             <a:fld id="{F7A69498-F8A3-46B9-97E8-6376C18B7280}" type="datetimeFigureOut">
               <a:rPr lang="de-DE" smtClean="0"/>
-              <a:t>24.02.2020</a:t>
+              <a:t>25.02.2020</a:t>
             </a:fld>
             <a:endParaRPr lang="de-DE" dirty="0"/>
           </a:p>
@@ -6779,7 +6779,7 @@
           <p:nvPr/>
         </p:nvPicPr>
         <p:blipFill>
-          <a:blip r:embed="rId3">
+          <a:blip r:embed="rId2">
             <a:extLst>
               <a:ext uri="{28A0092B-C50C-407E-A947-70E740481C1C}">
                 <a14:useLocalDpi xmlns:a14="http://schemas.microsoft.com/office/drawing/2010/main" val="0"/>
@@ -6798,6 +6798,53 @@
           <a:prstGeom prst="rect">
             <a:avLst/>
           </a:prstGeom>
+        </p:spPr>
+      </p:pic>
+      <p:pic>
+        <p:nvPicPr>
+          <p:cNvPr id="1025" name="Picture 1">
+            <a:extLst>
+              <a:ext uri="{FF2B5EF4-FFF2-40B4-BE49-F238E27FC236}">
+                <a16:creationId xmlns:a16="http://schemas.microsoft.com/office/drawing/2014/main" id="{BDD9BC22-8C1D-416F-8851-9F35F68FA987}"/>
+              </a:ext>
+            </a:extLst>
+          </p:cNvPr>
+          <p:cNvPicPr>
+            <a:picLocks noChangeAspect="1" noChangeArrowheads="1"/>
+          </p:cNvPicPr>
+          <p:nvPr/>
+        </p:nvPicPr>
+        <p:blipFill>
+          <a:blip r:embed="rId3">
+            <a:extLst>
+              <a:ext uri="{28A0092B-C50C-407E-A947-70E740481C1C}">
+                <a14:useLocalDpi xmlns:a14="http://schemas.microsoft.com/office/drawing/2010/main" val="0"/>
+              </a:ext>
+            </a:extLst>
+          </a:blip>
+          <a:srcRect/>
+          <a:stretch>
+            <a:fillRect/>
+          </a:stretch>
+        </p:blipFill>
+        <p:spPr bwMode="auto">
+          <a:xfrm>
+            <a:off x="0" y="0"/>
+            <a:ext cx="3190875" cy="2819400"/>
+          </a:xfrm>
+          <a:prstGeom prst="rect">
+            <a:avLst/>
+          </a:prstGeom>
+          <a:noFill/>
+          <a:extLst>
+            <a:ext uri="{909E8E84-426E-40DD-AFC4-6F175D3DCCD1}">
+              <a14:hiddenFill xmlns:a14="http://schemas.microsoft.com/office/drawing/2010/main">
+                <a:solidFill>
+                  <a:srgbClr val="FFFFFF"/>
+                </a:solidFill>
+              </a14:hiddenFill>
+            </a:ext>
+          </a:extLst>
         </p:spPr>
       </p:pic>
     </p:spTree>
@@ -8657,7 +8704,16 @@
           <a:bodyPr/>
           <a:lstStyle/>
           <a:p>
-            <a:endParaRPr lang="de-DE"/>
+            <a:r>
+              <a:rPr lang="de-DE" dirty="0"/>
+              <a:t>Methoden rufen sich selber auf</a:t>
+            </a:r>
+          </a:p>
+          <a:p>
+            <a:r>
+              <a:rPr lang="de-DE" dirty="0"/>
+              <a:t>Mit der richtigen Abbruchbedingung kann man Algorithmen einfach mehrfach wiederholen</a:t>
+            </a:r>
           </a:p>
         </p:txBody>
       </p:sp>

</xml_diff>